<commit_message>
Correct Problem Statement and Success Criteria
</commit_message>
<xml_diff>
--- a/Project 2 - Nordic Sensing Co/Nordic Sensing Co - Problem Identification.pptx
+++ b/Project 2 - Nordic Sensing Co/Nordic Sensing Co - Problem Identification.pptx
@@ -257,7 +257,7 @@
       </p15:sldGuideLst>
     </p:ext>
     <p:ext uri="http://customooxmlschemas.google.com/">
-      <go:slidesCustomData xmlns="" xmlns:mc="http://schemas.openxmlformats.org/markup-compatibility/2006" xmlns:mv="urn:schemas-microsoft-com:mac:vml" xmlns:c="http://schemas.openxmlformats.org/drawingml/2006/chart" xmlns:dgm="http://schemas.openxmlformats.org/drawingml/2006/diagram" xmlns:o="urn:schemas-microsoft-com:office:office" xmlns:v="urn:schemas-microsoft-com:vml" xmlns:pvml="urn:schemas-microsoft-com:office:powerpoint" xmlns:com="http://schemas.openxmlformats.org/drawingml/2006/compatibility" xmlns:p14="http://schemas.microsoft.com/office/powerpoint/2010/main" xmlns:p15="http://schemas.microsoft.com/office/powerpoint/2012/main" xmlns:go="http://customooxmlschemas.google.com/" r:id="rId7" roundtripDataSignature="AMtx7mjdo7FECp685JsX7/4pIVeoAktjNA=="/>
+      <go:slidesCustomData xmlns:go="http://customooxmlschemas.google.com/" xmlns:p15="http://schemas.microsoft.com/office/powerpoint/2012/main" xmlns:p14="http://schemas.microsoft.com/office/powerpoint/2010/main" xmlns:com="http://schemas.openxmlformats.org/drawingml/2006/compatibility" xmlns:pvml="urn:schemas-microsoft-com:office:powerpoint" xmlns:v="urn:schemas-microsoft-com:vml" xmlns:o="urn:schemas-microsoft-com:office:office" xmlns:dgm="http://schemas.openxmlformats.org/drawingml/2006/diagram" xmlns:c="http://schemas.openxmlformats.org/drawingml/2006/chart" xmlns:mv="urn:schemas-microsoft-com:mac:vml" xmlns:mc="http://schemas.openxmlformats.org/markup-compatibility/2006" xmlns="" r:id="rId7" roundtripDataSignature="AMtx7mjdo7FECp685JsX7/4pIVeoAktjNA=="/>
     </p:ext>
   </p:extLst>
 </p:presentation>
@@ -4823,7 +4823,7 @@
             </a:pPr>
             <a:r>
               <a:rPr lang="en-US" sz="1100" dirty="0"/>
-              <a:t>Detect the origin of the failures</a:t>
+              <a:t>Detect the origin of the 15% failure rate</a:t>
             </a:r>
           </a:p>
           <a:p>
@@ -5245,7 +5245,7 @@
                 <a:cs typeface="Arial"/>
                 <a:sym typeface="Arial"/>
               </a:rPr>
-              <a:t>How can we determine the origin of the 15% failure rate in the manufacturing process of the NSC’s </a:t>
+              <a:t>Determine if the origin of the 15% failure rate in the manufacturing process of the NSC’s </a:t>
             </a:r>
             <a:r>
               <a:rPr lang="en-US" sz="1400" i="0" u="none" strike="noStrike" cap="none" dirty="0" err="1">
@@ -5269,7 +5269,27 @@
                 <a:cs typeface="Arial"/>
                 <a:sym typeface="Arial"/>
               </a:rPr>
-              <a:t> sensor by April the 3</a:t>
+              <a:t> sensor should be solved by shuttin</a:t>
+            </a:r>
+            <a:r>
+              <a:rPr lang="en-US" dirty="0"/>
+              <a:t>g down a factory or stop buying certain parts </a:t>
+            </a:r>
+            <a:r>
+              <a:rPr lang="en-US"/>
+              <a:t>from a supplier </a:t>
+            </a:r>
+            <a:r>
+              <a:rPr lang="en-US" sz="1400" i="0" u="none" strike="noStrike" cap="none" dirty="0">
+                <a:solidFill>
+                  <a:srgbClr val="000000"/>
+                </a:solidFill>
+                <a:latin typeface="Arial"/>
+                <a:ea typeface="Arial"/>
+                <a:cs typeface="Arial"/>
+                <a:sym typeface="Arial"/>
+              </a:rPr>
+              <a:t>by April the 3</a:t>
             </a:r>
             <a:r>
               <a:rPr lang="en-US" sz="1400" i="0" u="none" strike="noStrike" cap="none" baseline="30000" dirty="0">
@@ -5346,7 +5366,7 @@
           <a:p>
             <a:r>
               <a:rPr lang="en-AU" dirty="0"/>
-              <a:t>Our scope will be on the manufacturing process for the </a:t>
+              <a:t>Our scope will be on the supply chain for the </a:t>
             </a:r>
             <a:r>
               <a:rPr lang="en-AU" dirty="0" err="1"/>

</xml_diff>